<commit_message>
Week2 Slides Minor Update
</commit_message>
<xml_diff>
--- a/tutorials/week3/week03-tutorial.pptx
+++ b/tutorials/week3/week03-tutorial.pptx
@@ -5,12 +5,13 @@
     <p:sldMasterId id="2147483661" r:id="rId1"/>
   </p:sldMasterIdLst>
   <p:notesMasterIdLst>
-    <p:notesMasterId r:id="rId5"/>
+    <p:notesMasterId r:id="rId6"/>
   </p:notesMasterIdLst>
   <p:sldIdLst>
     <p:sldId id="257" r:id="rId2"/>
-    <p:sldId id="260" r:id="rId3"/>
-    <p:sldId id="259" r:id="rId4"/>
+    <p:sldId id="261" r:id="rId3"/>
+    <p:sldId id="260" r:id="rId4"/>
+    <p:sldId id="259" r:id="rId5"/>
   </p:sldIdLst>
   <p:sldSz cx="9144000" cy="6858000" type="screen4x3"/>
   <p:notesSz cx="6858000" cy="9144000"/>
@@ -199,7 +200,7 @@
           <a:p>
             <a:fld id="{AC508C49-E8E1-7A44-A853-11D09BE4045B}" type="datetimeFigureOut">
               <a:rPr kumimoji="1" lang="zh-CN" altLang="en-US" smtClean="0"/>
-              <a:t>2025/8/8</a:t>
+              <a:t>2025/8/11</a:t>
             </a:fld>
             <a:endParaRPr kumimoji="1" lang="zh-CN" altLang="en-US"/>
           </a:p>
@@ -686,7 +687,7 @@
           <a:p>
             <a:fld id="{595ABECA-8C95-9C46-B151-62A4E6B6A47A}" type="datetimeFigureOut">
               <a:rPr kumimoji="1" lang="zh-CN" altLang="en-US" smtClean="0"/>
-              <a:t>2025/8/8</a:t>
+              <a:t>2025/8/11</a:t>
             </a:fld>
             <a:endParaRPr kumimoji="1" lang="zh-CN" altLang="en-US"/>
           </a:p>
@@ -856,7 +857,7 @@
           <a:p>
             <a:fld id="{595ABECA-8C95-9C46-B151-62A4E6B6A47A}" type="datetimeFigureOut">
               <a:rPr kumimoji="1" lang="zh-CN" altLang="en-US" smtClean="0"/>
-              <a:t>2025/8/8</a:t>
+              <a:t>2025/8/11</a:t>
             </a:fld>
             <a:endParaRPr kumimoji="1" lang="zh-CN" altLang="en-US"/>
           </a:p>
@@ -1036,7 +1037,7 @@
           <a:p>
             <a:fld id="{595ABECA-8C95-9C46-B151-62A4E6B6A47A}" type="datetimeFigureOut">
               <a:rPr kumimoji="1" lang="zh-CN" altLang="en-US" smtClean="0"/>
-              <a:t>2025/8/8</a:t>
+              <a:t>2025/8/11</a:t>
             </a:fld>
             <a:endParaRPr kumimoji="1" lang="zh-CN" altLang="en-US"/>
           </a:p>
@@ -1408,7 +1409,7 @@
           <a:p>
             <a:fld id="{595ABECA-8C95-9C46-B151-62A4E6B6A47A}" type="datetimeFigureOut">
               <a:rPr kumimoji="1" lang="zh-CN" altLang="en-US" smtClean="0"/>
-              <a:t>2025/8/8</a:t>
+              <a:t>2025/8/11</a:t>
             </a:fld>
             <a:endParaRPr kumimoji="1" lang="zh-CN" altLang="en-US"/>
           </a:p>
@@ -1652,7 +1653,7 @@
           <a:p>
             <a:fld id="{595ABECA-8C95-9C46-B151-62A4E6B6A47A}" type="datetimeFigureOut">
               <a:rPr kumimoji="1" lang="zh-CN" altLang="en-US" smtClean="0"/>
-              <a:t>2025/8/8</a:t>
+              <a:t>2025/8/11</a:t>
             </a:fld>
             <a:endParaRPr kumimoji="1" lang="zh-CN" altLang="en-US"/>
           </a:p>
@@ -1884,7 +1885,7 @@
           <a:p>
             <a:fld id="{595ABECA-8C95-9C46-B151-62A4E6B6A47A}" type="datetimeFigureOut">
               <a:rPr kumimoji="1" lang="zh-CN" altLang="en-US" smtClean="0"/>
-              <a:t>2025/8/8</a:t>
+              <a:t>2025/8/11</a:t>
             </a:fld>
             <a:endParaRPr kumimoji="1" lang="zh-CN" altLang="en-US"/>
           </a:p>
@@ -2251,7 +2252,7 @@
           <a:p>
             <a:fld id="{595ABECA-8C95-9C46-B151-62A4E6B6A47A}" type="datetimeFigureOut">
               <a:rPr kumimoji="1" lang="zh-CN" altLang="en-US" smtClean="0"/>
-              <a:t>2025/8/8</a:t>
+              <a:t>2025/8/11</a:t>
             </a:fld>
             <a:endParaRPr kumimoji="1" lang="zh-CN" altLang="en-US"/>
           </a:p>
@@ -2369,7 +2370,7 @@
           <a:p>
             <a:fld id="{595ABECA-8C95-9C46-B151-62A4E6B6A47A}" type="datetimeFigureOut">
               <a:rPr kumimoji="1" lang="zh-CN" altLang="en-US" smtClean="0"/>
-              <a:t>2025/8/8</a:t>
+              <a:t>2025/8/11</a:t>
             </a:fld>
             <a:endParaRPr kumimoji="1" lang="zh-CN" altLang="en-US"/>
           </a:p>
@@ -2464,7 +2465,7 @@
           <a:p>
             <a:fld id="{595ABECA-8C95-9C46-B151-62A4E6B6A47A}" type="datetimeFigureOut">
               <a:rPr kumimoji="1" lang="zh-CN" altLang="en-US" smtClean="0"/>
-              <a:t>2025/8/8</a:t>
+              <a:t>2025/8/11</a:t>
             </a:fld>
             <a:endParaRPr kumimoji="1" lang="zh-CN" altLang="en-US"/>
           </a:p>
@@ -2741,7 +2742,7 @@
           <a:p>
             <a:fld id="{595ABECA-8C95-9C46-B151-62A4E6B6A47A}" type="datetimeFigureOut">
               <a:rPr kumimoji="1" lang="zh-CN" altLang="en-US" smtClean="0"/>
-              <a:t>2025/8/8</a:t>
+              <a:t>2025/8/11</a:t>
             </a:fld>
             <a:endParaRPr kumimoji="1" lang="zh-CN" altLang="en-US"/>
           </a:p>
@@ -2998,7 +2999,7 @@
           <a:p>
             <a:fld id="{595ABECA-8C95-9C46-B151-62A4E6B6A47A}" type="datetimeFigureOut">
               <a:rPr kumimoji="1" lang="zh-CN" altLang="en-US" smtClean="0"/>
-              <a:t>2025/8/8</a:t>
+              <a:t>2025/8/11</a:t>
             </a:fld>
             <a:endParaRPr kumimoji="1" lang="zh-CN" altLang="en-US"/>
           </a:p>
@@ -3211,7 +3212,7 @@
           <a:p>
             <a:fld id="{595ABECA-8C95-9C46-B151-62A4E6B6A47A}" type="datetimeFigureOut">
               <a:rPr kumimoji="1" lang="zh-CN" altLang="en-US" smtClean="0"/>
-              <a:t>2025/8/8</a:t>
+              <a:t>2025/8/11</a:t>
             </a:fld>
             <a:endParaRPr kumimoji="1" lang="zh-CN" altLang="en-US"/>
           </a:p>
@@ -3700,6 +3701,139 @@
         <p:cNvPr id="1" name="">
           <a:extLst>
             <a:ext uri="{FF2B5EF4-FFF2-40B4-BE49-F238E27FC236}">
+              <a16:creationId xmlns:a16="http://schemas.microsoft.com/office/drawing/2014/main" id="{B3018816-EA3A-59F4-FDC4-2AC9844F0F5A}"/>
+            </a:ext>
+          </a:extLst>
+        </p:cNvPr>
+        <p:cNvGrpSpPr/>
+        <p:nvPr/>
+      </p:nvGrpSpPr>
+      <p:grpSpPr>
+        <a:xfrm>
+          <a:off x="0" y="0"/>
+          <a:ext cx="0" cy="0"/>
+          <a:chOff x="0" y="0"/>
+          <a:chExt cx="0" cy="0"/>
+        </a:xfrm>
+      </p:grpSpPr>
+      <p:sp>
+        <p:nvSpPr>
+          <p:cNvPr id="4" name="Title 1">
+            <a:extLst>
+              <a:ext uri="{FF2B5EF4-FFF2-40B4-BE49-F238E27FC236}">
+                <a16:creationId xmlns:a16="http://schemas.microsoft.com/office/drawing/2014/main" id="{BA6CD73C-13AE-8CDB-A263-001F9DF5A8CD}"/>
+              </a:ext>
+            </a:extLst>
+          </p:cNvPr>
+          <p:cNvSpPr txBox="1">
+            <a:spLocks/>
+          </p:cNvSpPr>
+          <p:nvPr/>
+        </p:nvSpPr>
+        <p:spPr>
+          <a:xfrm>
+            <a:off x="306977" y="495755"/>
+            <a:ext cx="8530046" cy="900000"/>
+          </a:xfrm>
+          <a:prstGeom prst="rect">
+            <a:avLst/>
+          </a:prstGeom>
+        </p:spPr>
+        <p:txBody>
+          <a:bodyPr vert="horz" lIns="91440" tIns="45720" rIns="91440" bIns="45720" rtlCol="0" anchor="ctr">
+            <a:normAutofit/>
+          </a:bodyPr>
+          <a:lstStyle>
+            <a:lvl1pPr algn="l" defTabSz="914400" rtl="0" eaLnBrk="1" latinLnBrk="0" hangingPunct="1">
+              <a:lnSpc>
+                <a:spcPct val="90000"/>
+              </a:lnSpc>
+              <a:spcBef>
+                <a:spcPct val="0"/>
+              </a:spcBef>
+              <a:buNone/>
+              <a:defRPr sz="4400" kern="1200">
+                <a:solidFill>
+                  <a:schemeClr val="tx1"/>
+                </a:solidFill>
+                <a:latin typeface="+mj-lt"/>
+                <a:ea typeface="+mj-ea"/>
+                <a:cs typeface="+mj-cs"/>
+              </a:defRPr>
+            </a:lvl1pPr>
+          </a:lstStyle>
+          <a:p>
+            <a:pPr algn="ctr"/>
+            <a:r>
+              <a:rPr lang="en-AU" dirty="0" err="1">
+                <a:solidFill>
+                  <a:srgbClr val="FF0000"/>
+                </a:solidFill>
+              </a:rPr>
+              <a:t>Levenshtein</a:t>
+            </a:r>
+            <a:r>
+              <a:rPr lang="en-AU" dirty="0">
+                <a:solidFill>
+                  <a:srgbClr val="FF0000"/>
+                </a:solidFill>
+              </a:rPr>
+              <a:t> Distance - Recursive</a:t>
+            </a:r>
+          </a:p>
+        </p:txBody>
+      </p:sp>
+      <p:pic>
+        <p:nvPicPr>
+          <p:cNvPr id="5" name="图片 4">
+            <a:extLst>
+              <a:ext uri="{FF2B5EF4-FFF2-40B4-BE49-F238E27FC236}">
+                <a16:creationId xmlns:a16="http://schemas.microsoft.com/office/drawing/2014/main" id="{5C5CC79A-A238-A46B-26D4-A342288B971C}"/>
+              </a:ext>
+            </a:extLst>
+          </p:cNvPr>
+          <p:cNvPicPr>
+            <a:picLocks noChangeAspect="1"/>
+          </p:cNvPicPr>
+          <p:nvPr/>
+        </p:nvPicPr>
+        <p:blipFill>
+          <a:blip r:embed="rId2"/>
+          <a:stretch>
+            <a:fillRect/>
+          </a:stretch>
+        </p:blipFill>
+        <p:spPr>
+          <a:xfrm>
+            <a:off x="1725" y="1902902"/>
+            <a:ext cx="9142275" cy="3477504"/>
+          </a:xfrm>
+          <a:prstGeom prst="rect">
+            <a:avLst/>
+          </a:prstGeom>
+        </p:spPr>
+      </p:pic>
+    </p:spTree>
+    <p:extLst>
+      <p:ext uri="{BB962C8B-B14F-4D97-AF65-F5344CB8AC3E}">
+        <p14:creationId xmlns:p14="http://schemas.microsoft.com/office/powerpoint/2010/main" val="1010869045"/>
+      </p:ext>
+    </p:extLst>
+  </p:cSld>
+  <p:clrMapOvr>
+    <a:masterClrMapping/>
+  </p:clrMapOvr>
+</p:sld>
+</file>
+
+<file path=ppt/slides/slide3.xml><?xml version="1.0" encoding="utf-8"?>
+<p:sld xmlns:a="http://schemas.openxmlformats.org/drawingml/2006/main" xmlns:r="http://schemas.openxmlformats.org/officeDocument/2006/relationships" xmlns:p="http://schemas.openxmlformats.org/presentationml/2006/main">
+  <p:cSld>
+    <p:spTree>
+      <p:nvGrpSpPr>
+        <p:cNvPr id="1" name="">
+          <a:extLst>
+            <a:ext uri="{FF2B5EF4-FFF2-40B4-BE49-F238E27FC236}">
               <a16:creationId xmlns:a16="http://schemas.microsoft.com/office/drawing/2014/main" id="{32F9B142-083D-E416-ACAD-0C7B8F5F380A}"/>
             </a:ext>
           </a:extLst>
@@ -4029,7 +4163,7 @@
 </p:sld>
 </file>
 
-<file path=ppt/slides/slide3.xml><?xml version="1.0" encoding="utf-8"?>
+<file path=ppt/slides/slide4.xml><?xml version="1.0" encoding="utf-8"?>
 <p:sld xmlns:a="http://schemas.openxmlformats.org/drawingml/2006/main" xmlns:r="http://schemas.openxmlformats.org/officeDocument/2006/relationships" xmlns:p="http://schemas.openxmlformats.org/presentationml/2006/main">
   <p:cSld>
     <p:spTree>

</xml_diff>